<commit_message>
Added risk assessment and final touch up
</commit_message>
<xml_diff>
--- a/Documentation/Presentation/HobbyProject.pptx
+++ b/Documentation/Presentation/HobbyProject.pptx
@@ -383,7 +383,7 @@
           <a:p>
             <a:fld id="{17E051C0-52B0-4E3C-A780-E78E876D14C3}" type="datetimeFigureOut">
               <a:rPr lang="en-GB" smtClean="0"/>
-              <a:t>20/06/2021</a:t>
+              <a:t>21/06/2021</a:t>
             </a:fld>
             <a:endParaRPr lang="en-GB"/>
           </a:p>
@@ -591,7 +591,7 @@
           <a:p>
             <a:fld id="{17E051C0-52B0-4E3C-A780-E78E876D14C3}" type="datetimeFigureOut">
               <a:rPr lang="en-GB" smtClean="0"/>
-              <a:t>20/06/2021</a:t>
+              <a:t>21/06/2021</a:t>
             </a:fld>
             <a:endParaRPr lang="en-GB"/>
           </a:p>
@@ -847,7 +847,7 @@
           <a:p>
             <a:fld id="{17E051C0-52B0-4E3C-A780-E78E876D14C3}" type="datetimeFigureOut">
               <a:rPr lang="en-GB" smtClean="0"/>
-              <a:t>20/06/2021</a:t>
+              <a:t>21/06/2021</a:t>
             </a:fld>
             <a:endParaRPr lang="en-GB"/>
           </a:p>
@@ -1021,7 +1021,7 @@
           <a:p>
             <a:fld id="{17E051C0-52B0-4E3C-A780-E78E876D14C3}" type="datetimeFigureOut">
               <a:rPr lang="en-GB" smtClean="0"/>
-              <a:t>20/06/2021</a:t>
+              <a:t>21/06/2021</a:t>
             </a:fld>
             <a:endParaRPr lang="en-GB"/>
           </a:p>
@@ -1364,7 +1364,7 @@
           <a:p>
             <a:fld id="{17E051C0-52B0-4E3C-A780-E78E876D14C3}" type="datetimeFigureOut">
               <a:rPr lang="en-GB" smtClean="0"/>
-              <a:t>20/06/2021</a:t>
+              <a:t>21/06/2021</a:t>
             </a:fld>
             <a:endParaRPr lang="en-GB"/>
           </a:p>
@@ -1639,7 +1639,7 @@
           <a:p>
             <a:fld id="{17E051C0-52B0-4E3C-A780-E78E876D14C3}" type="datetimeFigureOut">
               <a:rPr lang="en-GB" smtClean="0"/>
-              <a:t>20/06/2021</a:t>
+              <a:t>21/06/2021</a:t>
             </a:fld>
             <a:endParaRPr lang="en-GB"/>
           </a:p>
@@ -2018,7 +2018,7 @@
           <a:p>
             <a:fld id="{17E051C0-52B0-4E3C-A780-E78E876D14C3}" type="datetimeFigureOut">
               <a:rPr lang="en-GB" smtClean="0"/>
-              <a:t>20/06/2021</a:t>
+              <a:t>21/06/2021</a:t>
             </a:fld>
             <a:endParaRPr lang="en-GB"/>
           </a:p>
@@ -2136,7 +2136,7 @@
           <a:p>
             <a:fld id="{17E051C0-52B0-4E3C-A780-E78E876D14C3}" type="datetimeFigureOut">
               <a:rPr lang="en-GB" smtClean="0"/>
-              <a:t>20/06/2021</a:t>
+              <a:t>21/06/2021</a:t>
             </a:fld>
             <a:endParaRPr lang="en-GB"/>
           </a:p>
@@ -2307,7 +2307,7 @@
           <a:p>
             <a:fld id="{17E051C0-52B0-4E3C-A780-E78E876D14C3}" type="datetimeFigureOut">
               <a:rPr lang="en-GB" smtClean="0"/>
-              <a:t>20/06/2021</a:t>
+              <a:t>21/06/2021</a:t>
             </a:fld>
             <a:endParaRPr lang="en-GB"/>
           </a:p>
@@ -2661,7 +2661,7 @@
           <a:p>
             <a:fld id="{17E051C0-52B0-4E3C-A780-E78E876D14C3}" type="datetimeFigureOut">
               <a:rPr lang="en-GB" smtClean="0"/>
-              <a:t>20/06/2021</a:t>
+              <a:t>21/06/2021</a:t>
             </a:fld>
             <a:endParaRPr lang="en-GB"/>
           </a:p>
@@ -3043,7 +3043,7 @@
           <a:p>
             <a:fld id="{17E051C0-52B0-4E3C-A780-E78E876D14C3}" type="datetimeFigureOut">
               <a:rPr lang="en-GB" smtClean="0"/>
-              <a:t>20/06/2021</a:t>
+              <a:t>21/06/2021</a:t>
             </a:fld>
             <a:endParaRPr lang="en-GB"/>
           </a:p>
@@ -3330,7 +3330,7 @@
           <a:p>
             <a:fld id="{17E051C0-52B0-4E3C-A780-E78E876D14C3}" type="datetimeFigureOut">
               <a:rPr lang="en-GB" smtClean="0"/>
-              <a:t>20/06/2021</a:t>
+              <a:t>21/06/2021</a:t>
             </a:fld>
             <a:endParaRPr lang="en-GB"/>
           </a:p>
@@ -3872,12 +3872,14 @@
         </p:nvSpPr>
         <p:spPr/>
         <p:txBody>
-          <a:bodyPr/>
-          <a:lstStyle/>
-          <a:p>
-            <a:r>
-              <a:rPr lang="en-GB" dirty="0"/>
-              <a:t>Hobby Project</a:t>
+          <a:bodyPr>
+            <a:normAutofit/>
+          </a:bodyPr>
+          <a:lstStyle/>
+          <a:p>
+            <a:r>
+              <a:rPr lang="en-GB" sz="6000" dirty="0"/>
+              <a:t>Hobby Web Application Project</a:t>
             </a:r>
           </a:p>
         </p:txBody>
@@ -5589,7 +5591,7 @@
                 <a:ea typeface="Arial" panose="020B0604020202020204" pitchFamily="34" charset="0"/>
                 <a:cs typeface="Arial" panose="020B0604020202020204" pitchFamily="34" charset="0"/>
               </a:rPr>
-              <a:t>Created an OOP-based web application, with utilization of supporting tools and methodologies, covered during training.</a:t>
+              <a:t>Created a Full stack web application, with utilization of supporting tools and methodologies, covered during training.</a:t>
             </a:r>
           </a:p>
           <a:p>
@@ -5612,6 +5614,39 @@
               <a:ea typeface="Arial" panose="020B0604020202020204" pitchFamily="34" charset="0"/>
               <a:cs typeface="Arial" panose="020B0604020202020204" pitchFamily="34" charset="0"/>
             </a:endParaRPr>
+          </a:p>
+          <a:p>
+            <a:pPr marL="342900" indent="-342900">
+              <a:spcBef>
+                <a:spcPts val="795"/>
+              </a:spcBef>
+              <a:buFont typeface="Symbol" panose="05050102010706020507" pitchFamily="18" charset="2"/>
+              <a:buChar char=""/>
+              <a:tabLst>
+                <a:tab pos="546100" algn="l"/>
+              </a:tabLst>
+            </a:pPr>
+            <a:r>
+              <a:rPr lang="en-GB" sz="1800" dirty="0">
+                <a:solidFill>
+                  <a:srgbClr val="000000"/>
+                </a:solidFill>
+                <a:ea typeface="Calibri" panose="020F0502020204030204" pitchFamily="34" charset="0"/>
+                <a:cs typeface="Segoe UI" panose="020B0502040204020203" pitchFamily="34" charset="0"/>
+              </a:rPr>
+              <a:t>Persistent layer - A</a:t>
+            </a:r>
+            <a:r>
+              <a:rPr lang="en-GB" sz="1800" dirty="0">
+                <a:solidFill>
+                  <a:srgbClr val="000000"/>
+                </a:solidFill>
+                <a:effectLst/>
+                <a:ea typeface="Calibri" panose="020F0502020204030204" pitchFamily="34" charset="0"/>
+                <a:cs typeface="Segoe UI" panose="020B0502040204020203" pitchFamily="34" charset="0"/>
+              </a:rPr>
+              <a:t> managed database hosted locally or within the Cloud Provider (e.g. MySQL in GCP)</a:t>
+            </a:r>
           </a:p>
           <a:p>
             <a:pPr marL="342900" lvl="0" indent="-342900">
@@ -5633,7 +5668,29 @@
                 <a:ea typeface="Calibri" panose="020F0502020204030204" pitchFamily="34" charset="0"/>
                 <a:cs typeface="Segoe UI" panose="020B0502040204020203" pitchFamily="34" charset="0"/>
               </a:rPr>
-              <a:t>an application back-end developed using the language from your Programming Fundamentals module (e.g. Java)</a:t>
+              <a:t>Business Layer - An application back-end developed using the language from your Programming Fundamentals module (</a:t>
+            </a:r>
+            <a:r>
+              <a:rPr lang="en-GB" sz="1800" dirty="0" err="1">
+                <a:solidFill>
+                  <a:srgbClr val="000000"/>
+                </a:solidFill>
+                <a:effectLst/>
+                <a:ea typeface="Calibri" panose="020F0502020204030204" pitchFamily="34" charset="0"/>
+                <a:cs typeface="Segoe UI" panose="020B0502040204020203" pitchFamily="34" charset="0"/>
+              </a:rPr>
+              <a:t>e.g</a:t>
+            </a:r>
+            <a:r>
+              <a:rPr lang="en-GB" sz="1800" dirty="0">
+                <a:solidFill>
+                  <a:srgbClr val="000000"/>
+                </a:solidFill>
+                <a:effectLst/>
+                <a:ea typeface="Calibri" panose="020F0502020204030204" pitchFamily="34" charset="0"/>
+                <a:cs typeface="Segoe UI" panose="020B0502040204020203" pitchFamily="34" charset="0"/>
+              </a:rPr>
+              <a:t> Spring)</a:t>
             </a:r>
           </a:p>
           <a:p>
@@ -5656,30 +5713,7 @@
                 <a:ea typeface="Calibri" panose="020F0502020204030204" pitchFamily="34" charset="0"/>
                 <a:cs typeface="Segoe UI" panose="020B0502040204020203" pitchFamily="34" charset="0"/>
               </a:rPr>
-              <a:t>a managed database hosted locally or within the Cloud Provider examined during your Cloud Fundamentals module (e.g. MySQL in GCP)</a:t>
-            </a:r>
-          </a:p>
-          <a:p>
-            <a:pPr marL="342900" lvl="0" indent="-342900">
-              <a:spcBef>
-                <a:spcPts val="795"/>
-              </a:spcBef>
-              <a:buFont typeface="Symbol" panose="05050102010706020507" pitchFamily="18" charset="2"/>
-              <a:buChar char=""/>
-              <a:tabLst>
-                <a:tab pos="546100" algn="l"/>
-              </a:tabLst>
-            </a:pPr>
-            <a:r>
-              <a:rPr lang="en-GB" sz="1800" dirty="0">
-                <a:solidFill>
-                  <a:srgbClr val="000000"/>
-                </a:solidFill>
-                <a:effectLst/>
-                <a:ea typeface="Calibri" panose="020F0502020204030204" pitchFamily="34" charset="0"/>
-                <a:cs typeface="Segoe UI" panose="020B0502040204020203" pitchFamily="34" charset="0"/>
-              </a:rPr>
-              <a:t>a front-end developed using the language from your Front-End Web Technologies module (e.g. JavaScript)</a:t>
+              <a:t>Data Layer - A front-end developed using the language from your Front-End Web Technologies module (e.g. JavaScript)</a:t>
             </a:r>
           </a:p>
           <a:p>
@@ -5860,7 +5894,7 @@
                 <a:ea typeface="+mn-ea"/>
                 <a:cs typeface="Calibri"/>
               </a:rPr>
-              <a:t>Unit and Integration Testing</a:t>
+              <a:t>Testing</a:t>
             </a:r>
           </a:p>
           <a:p>
@@ -6309,7 +6343,7 @@
             </a:pPr>
             <a:r>
               <a:rPr lang="en-GB" dirty="0"/>
-              <a:t>Testing – Junit, Mockito and Selenium. </a:t>
+              <a:t>Testing – Junit, Mockito, Selenium and SonarQube. </a:t>
             </a:r>
           </a:p>
           <a:p>
@@ -6554,42 +6588,6 @@
           </a:prstGeom>
         </p:spPr>
       </p:pic>
-      <p:pic>
-        <p:nvPicPr>
-          <p:cNvPr id="5" name="Picture 4">
-            <a:extLst>
-              <a:ext uri="{FF2B5EF4-FFF2-40B4-BE49-F238E27FC236}">
-                <a16:creationId xmlns:a16="http://schemas.microsoft.com/office/drawing/2014/main" id="{C205F8F6-134D-433C-8575-2F326D316E70}"/>
-              </a:ext>
-            </a:extLst>
-          </p:cNvPr>
-          <p:cNvPicPr>
-            <a:picLocks noChangeAspect="1"/>
-          </p:cNvPicPr>
-          <p:nvPr/>
-        </p:nvPicPr>
-        <p:blipFill>
-          <a:blip r:embed="rId3">
-            <a:extLst>
-              <a:ext uri="{28A0092B-C50C-407E-A947-70E740481C1C}">
-                <a14:useLocalDpi xmlns:a14="http://schemas.microsoft.com/office/drawing/2010/main" val="0"/>
-              </a:ext>
-            </a:extLst>
-          </a:blip>
-          <a:stretch>
-            <a:fillRect/>
-          </a:stretch>
-        </p:blipFill>
-        <p:spPr>
-          <a:xfrm>
-            <a:off x="6719976" y="1846226"/>
-            <a:ext cx="4435703" cy="4419517"/>
-          </a:xfrm>
-          <a:prstGeom prst="rect">
-            <a:avLst/>
-          </a:prstGeom>
-        </p:spPr>
-      </p:pic>
       <p:sp>
         <p:nvSpPr>
           <p:cNvPr id="6" name="Rectangle 5">
@@ -6897,6 +6895,53 @@
           </a:p>
         </p:txBody>
       </p:sp>
+      <p:pic>
+        <p:nvPicPr>
+          <p:cNvPr id="1026" name="Picture 2">
+            <a:extLst>
+              <a:ext uri="{FF2B5EF4-FFF2-40B4-BE49-F238E27FC236}">
+                <a16:creationId xmlns:a16="http://schemas.microsoft.com/office/drawing/2014/main" id="{9E44C5C3-0E76-43C5-9ABF-B7CC38E72E54}"/>
+              </a:ext>
+            </a:extLst>
+          </p:cNvPr>
+          <p:cNvPicPr>
+            <a:picLocks noChangeAspect="1" noChangeArrowheads="1"/>
+          </p:cNvPicPr>
+          <p:nvPr/>
+        </p:nvPicPr>
+        <p:blipFill>
+          <a:blip r:embed="rId3">
+            <a:extLst>
+              <a:ext uri="{28A0092B-C50C-407E-A947-70E740481C1C}">
+                <a14:useLocalDpi xmlns:a14="http://schemas.microsoft.com/office/drawing/2010/main" val="0"/>
+              </a:ext>
+            </a:extLst>
+          </a:blip>
+          <a:srcRect/>
+          <a:stretch>
+            <a:fillRect/>
+          </a:stretch>
+        </p:blipFill>
+        <p:spPr bwMode="auto">
+          <a:xfrm>
+            <a:off x="7187040" y="1923792"/>
+            <a:ext cx="3968640" cy="4223966"/>
+          </a:xfrm>
+          <a:prstGeom prst="rect">
+            <a:avLst/>
+          </a:prstGeom>
+          <a:noFill/>
+          <a:extLst>
+            <a:ext uri="{909E8E84-426E-40DD-AFC4-6F175D3DCCD1}">
+              <a14:hiddenFill xmlns:a14="http://schemas.microsoft.com/office/drawing/2010/main">
+                <a:solidFill>
+                  <a:srgbClr val="FFFFFF"/>
+                </a:solidFill>
+              </a14:hiddenFill>
+            </a:ext>
+          </a:extLst>
+        </p:spPr>
+      </p:pic>
     </p:spTree>
     <p:extLst>
       <p:ext uri="{BB962C8B-B14F-4D97-AF65-F5344CB8AC3E}">

</xml_diff>